<commit_message>
Added further information regarding location text editors within MS Teams.
</commit_message>
<xml_diff>
--- a/Presentations/3. Installing text editors.pptx
+++ b/Presentations/3. Installing text editors.pptx
@@ -47101,7 +47101,7 @@
         <p:spPr/>
         <p:txBody>
           <a:bodyPr>
-            <a:normAutofit lnSpcReduction="10000"/>
+            <a:normAutofit fontScale="92500" lnSpcReduction="20000"/>
           </a:bodyPr>
           <a:lstStyle/>
           <a:p>
@@ -47150,6 +47150,43 @@
             <a:r>
               <a:rPr lang="en-US" sz="1800" dirty="0" smtClean="0"/>
               <a:t>)</a:t>
+            </a:r>
+          </a:p>
+          <a:p>
+            <a:pPr algn="just"/>
+            <a:r>
+              <a:rPr lang="en-US" sz="1800" dirty="0" smtClean="0"/>
+              <a:t>Alternatively, text editor binaries can be found within </a:t>
+            </a:r>
+            <a:r>
+              <a:rPr lang="en-US" sz="1800" dirty="0" smtClean="0">
+                <a:hlinkClick r:id="rId3"/>
+              </a:rPr>
+              <a:t>Files &gt; Text Editors </a:t>
+            </a:r>
+            <a:r>
+              <a:rPr lang="en-US" sz="1800" dirty="0" smtClean="0"/>
+              <a:t>from the </a:t>
+            </a:r>
+            <a:r>
+              <a:rPr lang="en-US" sz="1800" dirty="0" smtClean="0">
+                <a:hlinkClick r:id="rId4"/>
+              </a:rPr>
+              <a:t>Client Side Scripting (2021</a:t>
+            </a:r>
+            <a:r>
+              <a:rPr lang="en-US" sz="1800" smtClean="0">
+                <a:hlinkClick r:id="rId4"/>
+              </a:rPr>
+              <a:t>) </a:t>
+            </a:r>
+            <a:r>
+              <a:rPr lang="en-US" sz="1800" smtClean="0"/>
+              <a:t>group </a:t>
+            </a:r>
+            <a:r>
+              <a:rPr lang="en-US" sz="1800" dirty="0" smtClean="0"/>
+              <a:t>via Microsoft Teams. There are sub-folders for each source code editor.</a:t>
             </a:r>
           </a:p>
           <a:p>

</xml_diff>

<commit_message>
Update 3. Installing text editors.pptx
</commit_message>
<xml_diff>
--- a/Presentations/3. Installing text editors.pptx
+++ b/Presentations/3. Installing text editors.pptx
@@ -47035,7 +47035,7 @@
           <a:p>
             <a:r>
               <a:rPr lang="en-US" noProof="0" smtClean="0"/>
-              <a:t>MM.DD.20XX</a:t>
+              <a:t>Saturday, March 20, 2021</a:t>
             </a:r>
             <a:endParaRPr lang="en-US" noProof="0" dirty="0"/>
           </a:p>
@@ -47172,21 +47172,11 @@
               <a:rPr lang="en-US" sz="1800" dirty="0" smtClean="0">
                 <a:hlinkClick r:id="rId4"/>
               </a:rPr>
-              <a:t>Client Side Scripting (2021</a:t>
-            </a:r>
-            <a:r>
-              <a:rPr lang="en-US" sz="1800" smtClean="0">
-                <a:hlinkClick r:id="rId4"/>
-              </a:rPr>
-              <a:t>) </a:t>
-            </a:r>
-            <a:r>
-              <a:rPr lang="en-US" sz="1800" smtClean="0"/>
-              <a:t>group </a:t>
+              <a:t>Client Side Scripting (2021) </a:t>
             </a:r>
             <a:r>
               <a:rPr lang="en-US" sz="1800" dirty="0" smtClean="0"/>
-              <a:t>via Microsoft Teams. There are sub-folders for each source code editor.</a:t>
+              <a:t>group via Microsoft Teams. There are sub-folders for each source code editor.</a:t>
             </a:r>
           </a:p>
           <a:p>

</xml_diff>